<commit_message>
Filled in some info from my office.
git-svn-id: svn+ssh://vizrd.srn.sandia.gov/svnroot/kmorel/papers/ColorMaps/trunk@1338 61430140-fc74-48ae-be37-35807f1eb91a
</commit_message>
<xml_diff>
--- a/ColorMaps.pptx
+++ b/ColorMaps.pptx
@@ -5,10 +5,10 @@
     <p:sldMasterId id="2147483648" r:id="rId1"/>
   </p:sldMasterIdLst>
   <p:notesMasterIdLst>
-    <p:notesMasterId r:id="rId16"/>
+    <p:notesMasterId r:id="rId18"/>
   </p:notesMasterIdLst>
   <p:handoutMasterIdLst>
-    <p:handoutMasterId r:id="rId17"/>
+    <p:handoutMasterId r:id="rId19"/>
   </p:handoutMasterIdLst>
   <p:sldIdLst>
     <p:sldId id="256" r:id="rId2"/>
@@ -24,7 +24,9 @@
     <p:sldId id="266" r:id="rId12"/>
     <p:sldId id="267" r:id="rId13"/>
     <p:sldId id="268" r:id="rId14"/>
-    <p:sldId id="269" r:id="rId15"/>
+    <p:sldId id="270" r:id="rId15"/>
+    <p:sldId id="271" r:id="rId16"/>
+    <p:sldId id="269" r:id="rId17"/>
   </p:sldIdLst>
   <p:sldSz cx="9144000" cy="6858000" type="screen4x3"/>
   <p:notesSz cx="7010400" cy="9296400"/>
@@ -774,6 +776,14 @@
               <a:buFont typeface="Arial"/>
               <a:buChar char="•"/>
             </a:pPr>
+            <a:r>
+              <a:rPr lang="en-US" dirty="0" err="1" smtClean="0"/>
+              <a:t>Amalia</a:t>
+            </a:r>
+            <a:r>
+              <a:rPr lang="en-US" dirty="0" smtClean="0"/>
+              <a:t> Black, email correspondence, 10/12/2007.</a:t>
+            </a:r>
             <a:endParaRPr lang="en-US" dirty="0"/>
           </a:p>
         </p:txBody>
@@ -866,6 +876,284 @@
 </p:notes>
 </file>
 
+<file path=ppt/notesSlides/notesSlide14.xml><?xml version="1.0" encoding="utf-8"?>
+<p:notes xmlns:a="http://schemas.openxmlformats.org/drawingml/2006/main" xmlns:r="http://schemas.openxmlformats.org/officeDocument/2006/relationships" xmlns:mc="http://schemas.openxmlformats.org/markup-compatibility/2006" xmlns:mv="urn:schemas-microsoft-com:mac:vml" xmlns:p="http://schemas.openxmlformats.org/presentationml/2006/main" mc:Ignorable="mv" mc:PreserveAttributes="mv:*">
+  <p:cSld>
+    <p:spTree>
+      <p:nvGrpSpPr>
+        <p:cNvPr id="1" name=""/>
+        <p:cNvGrpSpPr/>
+        <p:nvPr/>
+      </p:nvGrpSpPr>
+      <p:grpSpPr>
+        <a:xfrm>
+          <a:off x="0" y="0"/>
+          <a:ext cx="0" cy="0"/>
+          <a:chOff x="0" y="0"/>
+          <a:chExt cx="0" cy="0"/>
+        </a:xfrm>
+      </p:grpSpPr>
+      <p:sp>
+        <p:nvSpPr>
+          <p:cNvPr id="2" name="Slide Image Placeholder 1"/>
+          <p:cNvSpPr>
+            <a:spLocks noGrp="1" noRot="1" noChangeAspect="1"/>
+          </p:cNvSpPr>
+          <p:nvPr>
+            <p:ph type="sldImg"/>
+          </p:nvPr>
+        </p:nvSpPr>
+        <p:spPr/>
+      </p:sp>
+      <p:sp>
+        <p:nvSpPr>
+          <p:cNvPr id="3" name="Notes Placeholder 2"/>
+          <p:cNvSpPr>
+            <a:spLocks noGrp="1"/>
+          </p:cNvSpPr>
+          <p:nvPr>
+            <p:ph type="body" idx="1"/>
+          </p:nvPr>
+        </p:nvSpPr>
+        <p:spPr/>
+        <p:txBody>
+          <a:bodyPr>
+            <a:normAutofit/>
+          </a:bodyPr>
+          <a:lstStyle/>
+          <a:p>
+            <a:pPr>
+              <a:buFont typeface="Arial"/>
+              <a:buChar char="•"/>
+            </a:pPr>
+            <a:r>
+              <a:rPr lang="en-US" dirty="0" smtClean="0"/>
+              <a:t>So, getting back to the original goal:</a:t>
+            </a:r>
+            <a:r>
+              <a:rPr lang="en-US" baseline="0" dirty="0" smtClean="0"/>
+              <a:t> getting rid of the rainbow color map.</a:t>
+            </a:r>
+          </a:p>
+          <a:p>
+            <a:pPr lvl="1">
+              <a:buFont typeface="Arial"/>
+              <a:buChar char="•"/>
+            </a:pPr>
+            <a:r>
+              <a:rPr lang="en-US" baseline="0" dirty="0" smtClean="0"/>
+              <a:t>I need a replacement.</a:t>
+            </a:r>
+          </a:p>
+          <a:p>
+            <a:pPr lvl="0">
+              <a:buFont typeface="Arial"/>
+              <a:buChar char="•"/>
+            </a:pPr>
+            <a:r>
+              <a:rPr lang="en-US" baseline="0" dirty="0" smtClean="0"/>
+              <a:t>Review the literature for better choices.</a:t>
+            </a:r>
+          </a:p>
+          <a:p>
+            <a:pPr lvl="0">
+              <a:buFont typeface="Arial"/>
+              <a:buChar char="•"/>
+            </a:pPr>
+            <a:r>
+              <a:rPr lang="en-US" baseline="0" dirty="0" smtClean="0"/>
+              <a:t>Ware provides these guidelines for choosing color maps.</a:t>
+            </a:r>
+          </a:p>
+          <a:p>
+            <a:pPr lvl="1">
+              <a:buFont typeface="Arial"/>
+              <a:buChar char="•"/>
+            </a:pPr>
+            <a:r>
+              <a:rPr lang="en-US" baseline="0" dirty="0" smtClean="0"/>
+              <a:t>As a </a:t>
+            </a:r>
+            <a:r>
+              <a:rPr lang="en-US" baseline="0" dirty="0" err="1" smtClean="0"/>
+              <a:t>vis</a:t>
+            </a:r>
+            <a:r>
+              <a:rPr lang="en-US" baseline="0" dirty="0" smtClean="0"/>
+              <a:t> expert, I should certainly be cognizant of these, but our end users are unlikely to know all or perhaps any of these.</a:t>
+            </a:r>
+          </a:p>
+          <a:p>
+            <a:pPr lvl="1">
+              <a:buFont typeface="Arial"/>
+              <a:buChar char="•"/>
+            </a:pPr>
+            <a:r>
+              <a:rPr lang="en-US" baseline="0" dirty="0" smtClean="0"/>
+              <a:t>I cannot rely on anyone, including myself, to always take all these guidelines into account.</a:t>
+            </a:r>
+          </a:p>
+          <a:p>
+            <a:pPr lvl="0">
+              <a:buFont typeface="Arial"/>
+              <a:buChar char="•"/>
+            </a:pPr>
+            <a:r>
+              <a:rPr lang="en-US" baseline="0" dirty="0" smtClean="0"/>
+              <a:t>What about just a color map?</a:t>
+            </a:r>
+            <a:endParaRPr lang="en-US" dirty="0"/>
+          </a:p>
+        </p:txBody>
+      </p:sp>
+    </p:spTree>
+  </p:cSld>
+  <p:clrMapOvr>
+    <a:masterClrMapping/>
+  </p:clrMapOvr>
+</p:notes>
+</file>
+
+<file path=ppt/notesSlides/notesSlide15.xml><?xml version="1.0" encoding="utf-8"?>
+<p:notes xmlns:a="http://schemas.openxmlformats.org/drawingml/2006/main" xmlns:r="http://schemas.openxmlformats.org/officeDocument/2006/relationships" xmlns:mc="http://schemas.openxmlformats.org/markup-compatibility/2006" xmlns:mv="urn:schemas-microsoft-com:mac:vml" xmlns:p="http://schemas.openxmlformats.org/presentationml/2006/main" mc:Ignorable="mv" mc:PreserveAttributes="mv:*">
+  <p:cSld>
+    <p:spTree>
+      <p:nvGrpSpPr>
+        <p:cNvPr id="1" name=""/>
+        <p:cNvGrpSpPr/>
+        <p:nvPr/>
+      </p:nvGrpSpPr>
+      <p:grpSpPr>
+        <a:xfrm>
+          <a:off x="0" y="0"/>
+          <a:ext cx="0" cy="0"/>
+          <a:chOff x="0" y="0"/>
+          <a:chExt cx="0" cy="0"/>
+        </a:xfrm>
+      </p:grpSpPr>
+      <p:sp>
+        <p:nvSpPr>
+          <p:cNvPr id="2" name="Slide Image Placeholder 1"/>
+          <p:cNvSpPr>
+            <a:spLocks noGrp="1" noRot="1" noChangeAspect="1"/>
+          </p:cNvSpPr>
+          <p:nvPr>
+            <p:ph type="sldImg"/>
+          </p:nvPr>
+        </p:nvSpPr>
+        <p:spPr/>
+      </p:sp>
+      <p:sp>
+        <p:nvSpPr>
+          <p:cNvPr id="3" name="Notes Placeholder 2"/>
+          <p:cNvSpPr>
+            <a:spLocks noGrp="1"/>
+          </p:cNvSpPr>
+          <p:nvPr>
+            <p:ph type="body" idx="1"/>
+          </p:nvPr>
+        </p:nvSpPr>
+        <p:spPr/>
+        <p:txBody>
+          <a:bodyPr>
+            <a:normAutofit/>
+          </a:bodyPr>
+          <a:lstStyle/>
+          <a:p>
+            <a:pPr>
+              <a:buFont typeface="Arial"/>
+              <a:buChar char="•"/>
+            </a:pPr>
+            <a:r>
+              <a:rPr lang="en-US" dirty="0" smtClean="0"/>
+              <a:t>There are lots of color maps suggested in literature.</a:t>
+            </a:r>
+          </a:p>
+          <a:p>
+            <a:pPr lvl="1">
+              <a:buFont typeface="Arial"/>
+              <a:buChar char="•"/>
+            </a:pPr>
+            <a:r>
+              <a:rPr lang="en-US" dirty="0" smtClean="0"/>
+              <a:t>Have different design constraints</a:t>
+            </a:r>
+            <a:r>
+              <a:rPr lang="en-US" baseline="0" dirty="0" smtClean="0"/>
+              <a:t> and their own attractors/detractors</a:t>
+            </a:r>
+          </a:p>
+          <a:p>
+            <a:pPr lvl="0">
+              <a:buFont typeface="Arial"/>
+              <a:buChar char="•"/>
+            </a:pPr>
+            <a:r>
+              <a:rPr lang="en-US" baseline="0" dirty="0" smtClean="0"/>
+              <a:t>Which one to use?  Depends on the situation.</a:t>
+            </a:r>
+          </a:p>
+          <a:p>
+            <a:pPr lvl="0">
+              <a:buFont typeface="Arial"/>
+              <a:buChar char="•"/>
+            </a:pPr>
+            <a:r>
+              <a:rPr lang="en-US" baseline="0" dirty="0" smtClean="0"/>
+              <a:t>Could provide an array of choices.  Picking the right one requires careful analysis using the guidelines shown before.</a:t>
+            </a:r>
+          </a:p>
+          <a:p>
+            <a:pPr lvl="0">
+              <a:buFont typeface="Arial"/>
+              <a:buChar char="•"/>
+            </a:pPr>
+            <a:r>
+              <a:rPr lang="en-US" baseline="0" dirty="0" smtClean="0"/>
+              <a:t>At some point the application is going to use some initial color map.</a:t>
+            </a:r>
+          </a:p>
+          <a:p>
+            <a:pPr lvl="1">
+              <a:buFont typeface="Arial"/>
+              <a:buChar char="•"/>
+            </a:pPr>
+            <a:r>
+              <a:rPr lang="en-US" baseline="0" dirty="0" smtClean="0"/>
+              <a:t>Most users, including myself, will just accept this one most (if not all) the time.</a:t>
+            </a:r>
+          </a:p>
+          <a:p>
+            <a:pPr lvl="1">
+              <a:buFont typeface="Arial"/>
+              <a:buChar char="•"/>
+            </a:pPr>
+            <a:r>
+              <a:rPr lang="en-US" baseline="0" dirty="0" smtClean="0"/>
+              <a:t>We cannot expect it to always be perfect, but we should be able to engineer it to be good (almost) all the time.</a:t>
+            </a:r>
+          </a:p>
+          <a:p>
+            <a:pPr lvl="1">
+              <a:buFont typeface="Arial"/>
+              <a:buChar char="•"/>
+            </a:pPr>
+            <a:r>
+              <a:rPr lang="en-US" baseline="0" dirty="0" smtClean="0"/>
+              <a:t>THAT is what we are looking for.</a:t>
+            </a:r>
+            <a:endParaRPr lang="en-US" dirty="0"/>
+          </a:p>
+        </p:txBody>
+      </p:sp>
+    </p:spTree>
+  </p:cSld>
+  <p:clrMapOvr>
+    <a:masterClrMapping/>
+  </p:clrMapOvr>
+</p:notes>
+</file>
+
 <file path=ppt/notesSlides/notesSlide2.xml><?xml version="1.0" encoding="utf-8"?>
 <p:notes xmlns:a="http://schemas.openxmlformats.org/drawingml/2006/main" xmlns:r="http://schemas.openxmlformats.org/officeDocument/2006/relationships" xmlns:mc="http://schemas.openxmlformats.org/markup-compatibility/2006" xmlns:mv="urn:schemas-microsoft-com:mac:vml" xmlns:p="http://schemas.openxmlformats.org/presentationml/2006/main" mc:Ignorable="mv" mc:PreserveAttributes="mv:*">
   <p:cSld>
@@ -912,15 +1200,39 @@
           </a:bodyPr>
           <a:lstStyle/>
           <a:p>
+            <a:pPr>
+              <a:buFont typeface="Arial"/>
+              <a:buChar char="•"/>
+            </a:pPr>
             <a:r>
               <a:rPr lang="en-US" dirty="0" smtClean="0"/>
               <a:t>So</a:t>
             </a:r>
             <a:r>
               <a:rPr lang="en-US" baseline="0" dirty="0" smtClean="0"/>
-              <a:t> I’m eating my lunch reading the latest issue of CG&amp;A…</a:t>
-            </a:r>
-            <a:endParaRPr lang="en-US" dirty="0"/>
+              <a:t> I’m eating my lunch reading the latest issue of CG&amp;A</a:t>
+            </a:r>
+            <a:r>
+              <a:rPr lang="en-US" baseline="0" dirty="0" smtClean="0"/>
+              <a:t>…</a:t>
+            </a:r>
+          </a:p>
+          <a:p>
+            <a:pPr>
+              <a:buFont typeface="Arial"/>
+              <a:buChar char="•"/>
+            </a:pPr>
+            <a:endParaRPr lang="en-US" baseline="0" dirty="0" smtClean="0"/>
+          </a:p>
+          <a:p>
+            <a:pPr>
+              <a:buFont typeface="Arial"/>
+              <a:buChar char="•"/>
+            </a:pPr>
+            <a:r>
+              <a:rPr lang="en-US" baseline="0" dirty="0" smtClean="0"/>
+              <a:t>We got called out.  I decided to make a change.</a:t>
+            </a:r>
           </a:p>
         </p:txBody>
       </p:sp>
@@ -4449,14 +4761,7 @@
                 <a:ea typeface="ＭＳ Ｐゴシック" pitchFamily="-106" charset="-128"/>
                 <a:cs typeface="ＭＳ Ｐゴシック" pitchFamily="-106" charset="-128"/>
               </a:rPr>
-              <a:t>December 2, </a:t>
-            </a:r>
-            <a:r>
-              <a:rPr lang="en-US" sz="2000" dirty="0" smtClean="0">
-                <a:ea typeface="ＭＳ Ｐゴシック" pitchFamily="-106" charset="-128"/>
-                <a:cs typeface="ＭＳ Ｐゴシック" pitchFamily="-106" charset="-128"/>
-              </a:rPr>
-              <a:t>2009</a:t>
+              <a:t>December 2, 2009</a:t>
             </a:r>
             <a:endParaRPr lang="en-US" dirty="0" smtClean="0">
               <a:effectLst>
@@ -4931,8 +5236,8 @@
         </p:nvSpPr>
         <p:spPr>
           <a:xfrm>
-            <a:off x="3137545" y="2895600"/>
-            <a:ext cx="2479532" cy="646331"/>
+            <a:off x="533400" y="2133600"/>
+            <a:ext cx="8305800" cy="3200400"/>
           </a:xfrm>
           <a:prstGeom prst="rect">
             <a:avLst/>
@@ -4940,17 +5245,28 @@
           <a:noFill/>
         </p:spPr>
         <p:txBody>
-          <a:bodyPr wrap="none" rtlCol="0">
-            <a:spAutoFit/>
+          <a:bodyPr wrap="square" rtlCol="0">
+            <a:normAutofit/>
           </a:bodyPr>
           <a:lstStyle/>
           <a:p>
             <a:pPr algn="ctr"/>
             <a:r>
               <a:rPr lang="en-US" sz="3600" i="1" dirty="0" smtClean="0"/>
-              <a:t>Separation.</a:t>
-            </a:r>
-            <a:endParaRPr lang="en-US" sz="3600" i="1" dirty="0"/>
+              <a:t>Now I understand why I like the rainbow band to display temperatures. The rainbow band produces </a:t>
+            </a:r>
+            <a:r>
+              <a:rPr lang="en-US" sz="3600" b="1" i="1" dirty="0" smtClean="0"/>
+              <a:t>sharper variations </a:t>
+            </a:r>
+            <a:r>
+              <a:rPr lang="en-US" sz="3600" i="1" dirty="0" smtClean="0"/>
+              <a:t>even if the images are misleading</a:t>
+            </a:r>
+            <a:r>
+              <a:rPr lang="en-US" sz="3600" i="1" dirty="0" smtClean="0"/>
+              <a:t> :)</a:t>
+            </a:r>
           </a:p>
         </p:txBody>
       </p:sp>
@@ -5319,6 +5635,906 @@
           <a:lstStyle/>
           <a:p>
             <a:r>
+              <a:rPr lang="en-US" dirty="0" smtClean="0"/>
+              <a:t>Guidelines for Color Maps</a:t>
+            </a:r>
+            <a:endParaRPr lang="en-US" dirty="0"/>
+          </a:p>
+        </p:txBody>
+      </p:sp>
+      <p:sp>
+        <p:nvSpPr>
+          <p:cNvPr id="3" name="Content Placeholder 2"/>
+          <p:cNvSpPr>
+            <a:spLocks noGrp="1"/>
+          </p:cNvSpPr>
+          <p:nvPr>
+            <p:ph idx="1"/>
+          </p:nvPr>
+        </p:nvSpPr>
+        <p:spPr/>
+        <p:txBody>
+          <a:bodyPr>
+            <a:normAutofit fontScale="55000" lnSpcReduction="20000"/>
+          </a:bodyPr>
+          <a:lstStyle/>
+          <a:p>
+            <a:r>
+              <a:rPr lang="en-US" dirty="0" smtClean="0"/>
+              <a:t>To show detail in a visualization, </a:t>
+            </a:r>
+            <a:r>
+              <a:rPr lang="en-US" i="1" dirty="0" smtClean="0"/>
+              <a:t>always</a:t>
+            </a:r>
+            <a:r>
+              <a:rPr lang="en-US" dirty="0" smtClean="0"/>
+              <a:t> have considerable luminance contrast between foreground and background information.  Never make the difference only through chromatic variation.</a:t>
+            </a:r>
+          </a:p>
+          <a:p>
+            <a:r>
+              <a:rPr lang="en-US" dirty="0" smtClean="0"/>
+              <a:t>Use only a few colors if they are distinct codes.</a:t>
+            </a:r>
+          </a:p>
+          <a:p>
+            <a:r>
+              <a:rPr lang="en-US" dirty="0" smtClean="0"/>
+              <a:t>Black or white borders around colored symbols can help make them distinct by ensuring a luminance contrast break with surrounding colors.</a:t>
+            </a:r>
+          </a:p>
+          <a:p>
+            <a:r>
+              <a:rPr lang="en-US" dirty="0" smtClean="0"/>
+              <a:t>Red, green, yellow, and blue are hard-wired into the brain as primaries.  If it is necessary to remember a color coding, these colors are the first that should be considered.</a:t>
+            </a:r>
+          </a:p>
+          <a:p>
+            <a:r>
+              <a:rPr lang="en-US" dirty="0" smtClean="0"/>
+              <a:t>When color-coding large areas, use muted colors, especially if colored symbols are to be superimposed.</a:t>
+            </a:r>
+          </a:p>
+          <a:p>
+            <a:r>
+              <a:rPr lang="en-US" dirty="0" smtClean="0"/>
+              <a:t>Small color-coded objects should be given high-saturation colors.</a:t>
+            </a:r>
+          </a:p>
+          <a:p>
+            <a:r>
+              <a:rPr lang="en-US" dirty="0" smtClean="0"/>
+              <a:t>When a perceptually meaningful ordering is needed, use a sequence that varies monotonically on at least one of the opponent color channels.  Examples are red to green, yellow to blue, low saturation to high saturation, and dark to light.  Variation on more than one channel is often better.</a:t>
+            </a:r>
+          </a:p>
+          <a:p>
+            <a:r>
+              <a:rPr lang="en-US" dirty="0" smtClean="0"/>
+              <a:t>If it is important to show variations above and below zero, use a neutral value to represent zero and use increases in saturation toward opposite colors to show positive and negative values.</a:t>
+            </a:r>
+          </a:p>
+          <a:p>
+            <a:r>
+              <a:rPr lang="en-US" dirty="0" smtClean="0"/>
+              <a:t>Color contrast can cause large errors in the representation of quantity.  Contrast errors can be reduced with borders around selected areas, or by using muted, relatively uniform backgrounds.</a:t>
+            </a:r>
+          </a:p>
+          <a:p>
+            <a:r>
+              <a:rPr lang="en-US" dirty="0" smtClean="0"/>
+              <a:t>For the reproduction of smooth color sequences, several million colors are needed under optimal viewing conditions.  In this case, care must be taken to calibrate the monitor and take into account monitor gamma values.</a:t>
+            </a:r>
+          </a:p>
+          <a:p>
+            <a:r>
+              <a:rPr lang="en-US" dirty="0" smtClean="0"/>
+              <a:t>When reproducing complex, continuously shaded images, it is critical to preserve the color relationships and to make sure that, under the particular lighting conditions, neutral values are perceived as neutral.</a:t>
+            </a:r>
+          </a:p>
+          <a:p>
+            <a:r>
+              <a:rPr lang="en-US" dirty="0" smtClean="0"/>
+              <a:t>Beware of </a:t>
+            </a:r>
+            <a:r>
+              <a:rPr lang="en-US" dirty="0" err="1" smtClean="0"/>
+              <a:t>oversaturating</a:t>
+            </a:r>
+            <a:r>
+              <a:rPr lang="en-US" dirty="0" smtClean="0"/>
+              <a:t> colors, especially when a printed image is to be the end product.</a:t>
+            </a:r>
+            <a:endParaRPr lang="en-US" dirty="0"/>
+          </a:p>
+        </p:txBody>
+      </p:sp>
+      <p:sp>
+        <p:nvSpPr>
+          <p:cNvPr id="5" name="TextBox 4"/>
+          <p:cNvSpPr txBox="1"/>
+          <p:nvPr/>
+        </p:nvSpPr>
+        <p:spPr>
+          <a:xfrm>
+            <a:off x="381000" y="6096000"/>
+            <a:ext cx="5891231" cy="400110"/>
+          </a:xfrm>
+          <a:prstGeom prst="rect">
+            <a:avLst/>
+          </a:prstGeom>
+          <a:noFill/>
+        </p:spPr>
+        <p:txBody>
+          <a:bodyPr wrap="none" rtlCol="0">
+            <a:spAutoFit/>
+          </a:bodyPr>
+          <a:lstStyle/>
+          <a:p>
+            <a:r>
+              <a:rPr lang="en-US" sz="2000" dirty="0" smtClean="0"/>
+              <a:t>Ware, </a:t>
+            </a:r>
+            <a:r>
+              <a:rPr lang="en-US" sz="2000" i="1" dirty="0" smtClean="0"/>
+              <a:t>Information Visualization: Perception for Design</a:t>
+            </a:r>
+            <a:endParaRPr lang="en-US" sz="2000" dirty="0"/>
+          </a:p>
+        </p:txBody>
+      </p:sp>
+    </p:spTree>
+  </p:cSld>
+  <p:clrMapOvr>
+    <a:masterClrMapping/>
+  </p:clrMapOvr>
+  <p:transition>
+    <p:fade/>
+  </p:transition>
+</p:sld>
+</file>
+
+<file path=ppt/slides/slide15.xml><?xml version="1.0" encoding="utf-8"?>
+<p:sld xmlns:a="http://schemas.openxmlformats.org/drawingml/2006/main" xmlns:r="http://schemas.openxmlformats.org/officeDocument/2006/relationships" xmlns:mc="http://schemas.openxmlformats.org/markup-compatibility/2006" xmlns:mv="urn:schemas-microsoft-com:mac:vml" xmlns:p="http://schemas.openxmlformats.org/presentationml/2006/main" mc:Ignorable="mv" mc:PreserveAttributes="mv:*">
+  <p:cSld>
+    <p:spTree>
+      <p:nvGrpSpPr>
+        <p:cNvPr id="1" name=""/>
+        <p:cNvGrpSpPr/>
+        <p:nvPr/>
+      </p:nvGrpSpPr>
+      <p:grpSpPr>
+        <a:xfrm>
+          <a:off x="0" y="0"/>
+          <a:ext cx="0" cy="0"/>
+          <a:chOff x="0" y="0"/>
+          <a:chExt cx="0" cy="0"/>
+        </a:xfrm>
+      </p:grpSpPr>
+      <p:sp>
+        <p:nvSpPr>
+          <p:cNvPr id="2" name="Title 1"/>
+          <p:cNvSpPr>
+            <a:spLocks noGrp="1"/>
+          </p:cNvSpPr>
+          <p:nvPr>
+            <p:ph type="title"/>
+          </p:nvPr>
+        </p:nvSpPr>
+        <p:spPr/>
+        <p:txBody>
+          <a:bodyPr/>
+          <a:lstStyle/>
+          <a:p>
+            <a:r>
+              <a:rPr lang="en-US" dirty="0" smtClean="0"/>
+              <a:t>Suggested Color Maps</a:t>
+            </a:r>
+            <a:endParaRPr lang="en-US" dirty="0"/>
+          </a:p>
+        </p:txBody>
+      </p:sp>
+      <p:sp>
+        <p:nvSpPr>
+          <p:cNvPr id="4" name="Rectangle 3"/>
+          <p:cNvSpPr/>
+          <p:nvPr/>
+        </p:nvSpPr>
+        <p:spPr bwMode="auto">
+          <a:xfrm>
+            <a:off x="838200" y="1676400"/>
+            <a:ext cx="3657600" cy="685800"/>
+          </a:xfrm>
+          <a:prstGeom prst="rect">
+            <a:avLst/>
+          </a:prstGeom>
+          <a:gradFill flip="none" rotWithShape="1">
+            <a:gsLst>
+              <a:gs pos="0">
+                <a:srgbClr val="010000"/>
+              </a:gs>
+              <a:gs pos="100000">
+                <a:srgbClr val="FFFFFF"/>
+              </a:gs>
+            </a:gsLst>
+            <a:lin ang="0" scaled="1"/>
+            <a:tileRect/>
+          </a:gradFill>
+          <a:ln w="3175" cap="flat" cmpd="sng" algn="ctr">
+            <a:solidFill>
+              <a:schemeClr val="tx1"/>
+            </a:solidFill>
+            <a:prstDash val="solid"/>
+            <a:round/>
+            <a:headEnd type="none" w="med" len="med"/>
+            <a:tailEnd type="none" w="med" len="med"/>
+          </a:ln>
+          <a:effectLst/>
+        </p:spPr>
+        <p:txBody>
+          <a:bodyPr vert="horz" wrap="square" lIns="91440" tIns="45720" rIns="91440" bIns="45720" numCol="1" rtlCol="0" anchor="t" anchorCtr="0" compatLnSpc="1">
+            <a:prstTxWarp prst="textNoShape">
+              <a:avLst/>
+            </a:prstTxWarp>
+          </a:bodyPr>
+          <a:lstStyle/>
+          <a:p>
+            <a:pPr marL="0" marR="0" indent="0" algn="l" defTabSz="914400" rtl="0" eaLnBrk="0" fontAlgn="base" latinLnBrk="0" hangingPunct="0">
+              <a:lnSpc>
+                <a:spcPct val="100000"/>
+              </a:lnSpc>
+              <a:spcBef>
+                <a:spcPct val="0"/>
+              </a:spcBef>
+              <a:spcAft>
+                <a:spcPct val="0"/>
+              </a:spcAft>
+              <a:buClrTx/>
+              <a:buSzTx/>
+              <a:buFontTx/>
+              <a:buNone/>
+              <a:tabLst/>
+            </a:pPr>
+            <a:endParaRPr kumimoji="0" lang="en-US" sz="2400" b="0" i="0" u="none" strike="noStrike" cap="none" normalizeH="0" baseline="0">
+              <a:ln>
+                <a:noFill/>
+              </a:ln>
+              <a:solidFill>
+                <a:schemeClr val="tx1"/>
+              </a:solidFill>
+              <a:effectLst/>
+              <a:latin typeface="Times New Roman" charset="0"/>
+            </a:endParaRPr>
+          </a:p>
+        </p:txBody>
+      </p:sp>
+      <p:sp>
+        <p:nvSpPr>
+          <p:cNvPr id="5" name="Rectangle 4"/>
+          <p:cNvSpPr/>
+          <p:nvPr/>
+        </p:nvSpPr>
+        <p:spPr bwMode="auto">
+          <a:xfrm>
+            <a:off x="838200" y="2692400"/>
+            <a:ext cx="3657600" cy="685800"/>
+          </a:xfrm>
+          <a:prstGeom prst="rect">
+            <a:avLst/>
+          </a:prstGeom>
+          <a:gradFill flip="none" rotWithShape="1">
+            <a:gsLst>
+              <a:gs pos="0">
+                <a:srgbClr val="FF0000"/>
+              </a:gs>
+              <a:gs pos="100000">
+                <a:srgbClr val="FFFFFF"/>
+              </a:gs>
+            </a:gsLst>
+            <a:lin ang="0" scaled="1"/>
+            <a:tileRect/>
+          </a:gradFill>
+          <a:ln w="3175" cap="flat" cmpd="sng" algn="ctr">
+            <a:solidFill>
+              <a:schemeClr val="tx1"/>
+            </a:solidFill>
+            <a:prstDash val="solid"/>
+            <a:round/>
+            <a:headEnd type="none" w="med" len="med"/>
+            <a:tailEnd type="none" w="med" len="med"/>
+          </a:ln>
+          <a:effectLst/>
+        </p:spPr>
+        <p:txBody>
+          <a:bodyPr vert="horz" wrap="square" lIns="91440" tIns="45720" rIns="91440" bIns="45720" numCol="1" rtlCol="0" anchor="t" anchorCtr="0" compatLnSpc="1">
+            <a:prstTxWarp prst="textNoShape">
+              <a:avLst/>
+            </a:prstTxWarp>
+          </a:bodyPr>
+          <a:lstStyle/>
+          <a:p>
+            <a:pPr marL="0" marR="0" indent="0" algn="l" defTabSz="914400" rtl="0" eaLnBrk="0" fontAlgn="base" latinLnBrk="0" hangingPunct="0">
+              <a:lnSpc>
+                <a:spcPct val="100000"/>
+              </a:lnSpc>
+              <a:spcBef>
+                <a:spcPct val="0"/>
+              </a:spcBef>
+              <a:spcAft>
+                <a:spcPct val="0"/>
+              </a:spcAft>
+              <a:buClrTx/>
+              <a:buSzTx/>
+              <a:buFontTx/>
+              <a:buNone/>
+              <a:tabLst/>
+            </a:pPr>
+            <a:endParaRPr kumimoji="0" lang="en-US" sz="2400" b="0" i="0" u="none" strike="noStrike" cap="none" normalizeH="0" baseline="0">
+              <a:ln>
+                <a:noFill/>
+              </a:ln>
+              <a:solidFill>
+                <a:schemeClr val="tx1"/>
+              </a:solidFill>
+              <a:effectLst/>
+              <a:latin typeface="Times New Roman" charset="0"/>
+            </a:endParaRPr>
+          </a:p>
+        </p:txBody>
+      </p:sp>
+      <p:sp>
+        <p:nvSpPr>
+          <p:cNvPr id="6" name="Rectangle 5"/>
+          <p:cNvSpPr/>
+          <p:nvPr/>
+        </p:nvSpPr>
+        <p:spPr bwMode="auto">
+          <a:xfrm>
+            <a:off x="4724400" y="1676400"/>
+            <a:ext cx="3657600" cy="685800"/>
+          </a:xfrm>
+          <a:prstGeom prst="rect">
+            <a:avLst/>
+          </a:prstGeom>
+          <a:gradFill flip="none" rotWithShape="1">
+            <a:gsLst>
+              <a:gs pos="0">
+                <a:srgbClr val="010000"/>
+              </a:gs>
+              <a:gs pos="100000">
+                <a:srgbClr val="FFFFFF"/>
+              </a:gs>
+              <a:gs pos="21000">
+                <a:srgbClr val="660066"/>
+              </a:gs>
+              <a:gs pos="47000">
+                <a:srgbClr val="A00000"/>
+              </a:gs>
+              <a:gs pos="81000">
+                <a:srgbClr val="DAD300"/>
+              </a:gs>
+            </a:gsLst>
+            <a:lin ang="0" scaled="1"/>
+            <a:tileRect/>
+          </a:gradFill>
+          <a:ln w="3175" cap="flat" cmpd="sng" algn="ctr">
+            <a:solidFill>
+              <a:schemeClr val="tx1"/>
+            </a:solidFill>
+            <a:prstDash val="solid"/>
+            <a:round/>
+            <a:headEnd type="none" w="med" len="med"/>
+            <a:tailEnd type="none" w="med" len="med"/>
+          </a:ln>
+          <a:effectLst/>
+        </p:spPr>
+        <p:txBody>
+          <a:bodyPr vert="horz" wrap="square" lIns="91440" tIns="45720" rIns="91440" bIns="45720" numCol="1" rtlCol="0" anchor="t" anchorCtr="0" compatLnSpc="1">
+            <a:prstTxWarp prst="textNoShape">
+              <a:avLst/>
+            </a:prstTxWarp>
+          </a:bodyPr>
+          <a:lstStyle/>
+          <a:p>
+            <a:pPr marL="0" marR="0" indent="0" algn="l" defTabSz="914400" rtl="0" eaLnBrk="0" fontAlgn="base" latinLnBrk="0" hangingPunct="0">
+              <a:lnSpc>
+                <a:spcPct val="100000"/>
+              </a:lnSpc>
+              <a:spcBef>
+                <a:spcPct val="0"/>
+              </a:spcBef>
+              <a:spcAft>
+                <a:spcPct val="0"/>
+              </a:spcAft>
+              <a:buClrTx/>
+              <a:buSzTx/>
+              <a:buFontTx/>
+              <a:buNone/>
+              <a:tabLst/>
+            </a:pPr>
+            <a:endParaRPr kumimoji="0" lang="en-US" sz="2400" b="0" i="0" u="none" strike="noStrike" cap="none" normalizeH="0" baseline="0">
+              <a:ln>
+                <a:noFill/>
+              </a:ln>
+              <a:solidFill>
+                <a:schemeClr val="tx1"/>
+              </a:solidFill>
+              <a:effectLst/>
+              <a:latin typeface="Times New Roman" charset="0"/>
+            </a:endParaRPr>
+          </a:p>
+        </p:txBody>
+      </p:sp>
+      <p:sp>
+        <p:nvSpPr>
+          <p:cNvPr id="7" name="Rectangle 6"/>
+          <p:cNvSpPr/>
+          <p:nvPr/>
+        </p:nvSpPr>
+        <p:spPr bwMode="auto">
+          <a:xfrm>
+            <a:off x="4724400" y="2692400"/>
+            <a:ext cx="3657600" cy="685800"/>
+          </a:xfrm>
+          <a:prstGeom prst="rect">
+            <a:avLst/>
+          </a:prstGeom>
+          <a:gradFill flip="none" rotWithShape="1">
+            <a:gsLst>
+              <a:gs pos="0">
+                <a:srgbClr val="0000FF"/>
+              </a:gs>
+              <a:gs pos="100000">
+                <a:srgbClr val="FFFF00"/>
+              </a:gs>
+            </a:gsLst>
+            <a:lin ang="0" scaled="1"/>
+            <a:tileRect/>
+          </a:gradFill>
+          <a:ln w="3175" cap="flat" cmpd="sng" algn="ctr">
+            <a:solidFill>
+              <a:schemeClr val="tx1"/>
+            </a:solidFill>
+            <a:prstDash val="solid"/>
+            <a:round/>
+            <a:headEnd type="none" w="med" len="med"/>
+            <a:tailEnd type="none" w="med" len="med"/>
+          </a:ln>
+          <a:effectLst/>
+        </p:spPr>
+        <p:txBody>
+          <a:bodyPr vert="horz" wrap="square" lIns="91440" tIns="45720" rIns="91440" bIns="45720" numCol="1" rtlCol="0" anchor="t" anchorCtr="0" compatLnSpc="1">
+            <a:prstTxWarp prst="textNoShape">
+              <a:avLst/>
+            </a:prstTxWarp>
+          </a:bodyPr>
+          <a:lstStyle/>
+          <a:p>
+            <a:pPr marL="0" marR="0" indent="0" algn="l" defTabSz="914400" rtl="0" eaLnBrk="0" fontAlgn="base" latinLnBrk="0" hangingPunct="0">
+              <a:lnSpc>
+                <a:spcPct val="100000"/>
+              </a:lnSpc>
+              <a:spcBef>
+                <a:spcPct val="0"/>
+              </a:spcBef>
+              <a:spcAft>
+                <a:spcPct val="0"/>
+              </a:spcAft>
+              <a:buClrTx/>
+              <a:buSzTx/>
+              <a:buFontTx/>
+              <a:buNone/>
+              <a:tabLst/>
+            </a:pPr>
+            <a:endParaRPr kumimoji="0" lang="en-US" sz="2400" b="0" i="0" u="none" strike="noStrike" cap="none" normalizeH="0" baseline="0">
+              <a:ln>
+                <a:noFill/>
+              </a:ln>
+              <a:solidFill>
+                <a:schemeClr val="tx1"/>
+              </a:solidFill>
+              <a:effectLst/>
+              <a:latin typeface="Times New Roman" charset="0"/>
+            </a:endParaRPr>
+          </a:p>
+        </p:txBody>
+      </p:sp>
+      <p:sp>
+        <p:nvSpPr>
+          <p:cNvPr id="8" name="Rectangle 7"/>
+          <p:cNvSpPr/>
+          <p:nvPr/>
+        </p:nvSpPr>
+        <p:spPr bwMode="auto">
+          <a:xfrm>
+            <a:off x="4724400" y="3708400"/>
+            <a:ext cx="3657600" cy="685800"/>
+          </a:xfrm>
+          <a:prstGeom prst="rect">
+            <a:avLst/>
+          </a:prstGeom>
+          <a:gradFill flip="none" rotWithShape="1">
+            <a:gsLst>
+              <a:gs pos="0">
+                <a:srgbClr val="0000FF"/>
+              </a:gs>
+              <a:gs pos="100000">
+                <a:srgbClr val="008000"/>
+              </a:gs>
+            </a:gsLst>
+            <a:lin ang="0" scaled="1"/>
+            <a:tileRect/>
+          </a:gradFill>
+          <a:ln w="3175" cap="flat" cmpd="sng" algn="ctr">
+            <a:solidFill>
+              <a:schemeClr val="tx1"/>
+            </a:solidFill>
+            <a:prstDash val="solid"/>
+            <a:round/>
+            <a:headEnd type="none" w="med" len="med"/>
+            <a:tailEnd type="none" w="med" len="med"/>
+          </a:ln>
+          <a:effectLst/>
+        </p:spPr>
+        <p:txBody>
+          <a:bodyPr vert="horz" wrap="square" lIns="91440" tIns="45720" rIns="91440" bIns="45720" numCol="1" rtlCol="0" anchor="t" anchorCtr="0" compatLnSpc="1">
+            <a:prstTxWarp prst="textNoShape">
+              <a:avLst/>
+            </a:prstTxWarp>
+          </a:bodyPr>
+          <a:lstStyle/>
+          <a:p>
+            <a:pPr marL="0" marR="0" indent="0" algn="l" defTabSz="914400" rtl="0" eaLnBrk="0" fontAlgn="base" latinLnBrk="0" hangingPunct="0">
+              <a:lnSpc>
+                <a:spcPct val="100000"/>
+              </a:lnSpc>
+              <a:spcBef>
+                <a:spcPct val="0"/>
+              </a:spcBef>
+              <a:spcAft>
+                <a:spcPct val="0"/>
+              </a:spcAft>
+              <a:buClrTx/>
+              <a:buSzTx/>
+              <a:buFontTx/>
+              <a:buNone/>
+              <a:tabLst/>
+            </a:pPr>
+            <a:endParaRPr kumimoji="0" lang="en-US" sz="2400" b="0" i="0" u="none" strike="noStrike" cap="none" normalizeH="0" baseline="0">
+              <a:ln>
+                <a:noFill/>
+              </a:ln>
+              <a:solidFill>
+                <a:schemeClr val="tx1"/>
+              </a:solidFill>
+              <a:effectLst/>
+              <a:latin typeface="Times New Roman" charset="0"/>
+            </a:endParaRPr>
+          </a:p>
+        </p:txBody>
+      </p:sp>
+      <p:sp>
+        <p:nvSpPr>
+          <p:cNvPr id="9" name="Rectangle 8"/>
+          <p:cNvSpPr/>
+          <p:nvPr/>
+        </p:nvSpPr>
+        <p:spPr bwMode="auto">
+          <a:xfrm>
+            <a:off x="4724400" y="4724400"/>
+            <a:ext cx="3657600" cy="685800"/>
+          </a:xfrm>
+          <a:prstGeom prst="rect">
+            <a:avLst/>
+          </a:prstGeom>
+          <a:gradFill flip="none" rotWithShape="1">
+            <a:gsLst>
+              <a:gs pos="100000">
+                <a:srgbClr val="FFFFFF"/>
+              </a:gs>
+              <a:gs pos="0">
+                <a:srgbClr val="660066"/>
+              </a:gs>
+              <a:gs pos="27000">
+                <a:srgbClr val="B10000"/>
+              </a:gs>
+              <a:gs pos="90000">
+                <a:srgbClr val="E6D800"/>
+              </a:gs>
+              <a:gs pos="51000">
+                <a:srgbClr val="39CD00"/>
+              </a:gs>
+              <a:gs pos="67000">
+                <a:srgbClr val="00FFFF"/>
+              </a:gs>
+              <a:gs pos="82000">
+                <a:srgbClr val="F9A700"/>
+              </a:gs>
+            </a:gsLst>
+            <a:lin ang="0" scaled="1"/>
+            <a:tileRect/>
+          </a:gradFill>
+          <a:ln w="3175" cap="flat" cmpd="sng" algn="ctr">
+            <a:solidFill>
+              <a:schemeClr val="tx1"/>
+            </a:solidFill>
+            <a:prstDash val="solid"/>
+            <a:round/>
+            <a:headEnd type="none" w="med" len="med"/>
+            <a:tailEnd type="none" w="med" len="med"/>
+          </a:ln>
+          <a:effectLst/>
+        </p:spPr>
+        <p:txBody>
+          <a:bodyPr vert="horz" wrap="square" lIns="91440" tIns="45720" rIns="91440" bIns="45720" numCol="1" rtlCol="0" anchor="t" anchorCtr="0" compatLnSpc="1">
+            <a:prstTxWarp prst="textNoShape">
+              <a:avLst/>
+            </a:prstTxWarp>
+          </a:bodyPr>
+          <a:lstStyle/>
+          <a:p>
+            <a:pPr marL="0" marR="0" indent="0" algn="l" defTabSz="914400" rtl="0" eaLnBrk="0" fontAlgn="base" latinLnBrk="0" hangingPunct="0">
+              <a:lnSpc>
+                <a:spcPct val="100000"/>
+              </a:lnSpc>
+              <a:spcBef>
+                <a:spcPct val="0"/>
+              </a:spcBef>
+              <a:spcAft>
+                <a:spcPct val="0"/>
+              </a:spcAft>
+              <a:buClrTx/>
+              <a:buSzTx/>
+              <a:buFontTx/>
+              <a:buNone/>
+              <a:tabLst/>
+            </a:pPr>
+            <a:endParaRPr kumimoji="0" lang="en-US" sz="2400" b="0" i="0" u="none" strike="noStrike" cap="none" normalizeH="0" baseline="0">
+              <a:ln>
+                <a:noFill/>
+              </a:ln>
+              <a:solidFill>
+                <a:schemeClr val="tx1"/>
+              </a:solidFill>
+              <a:effectLst/>
+              <a:latin typeface="Times New Roman" charset="0"/>
+            </a:endParaRPr>
+          </a:p>
+        </p:txBody>
+      </p:sp>
+      <p:sp>
+        <p:nvSpPr>
+          <p:cNvPr id="10" name="Rectangle 9"/>
+          <p:cNvSpPr/>
+          <p:nvPr/>
+        </p:nvSpPr>
+        <p:spPr bwMode="auto">
+          <a:xfrm>
+            <a:off x="838200" y="3708400"/>
+            <a:ext cx="3657600" cy="685800"/>
+          </a:xfrm>
+          <a:prstGeom prst="rect">
+            <a:avLst/>
+          </a:prstGeom>
+          <a:gradFill flip="none" rotWithShape="1">
+            <a:gsLst>
+              <a:gs pos="0">
+                <a:srgbClr val="40B100"/>
+              </a:gs>
+              <a:gs pos="100000">
+                <a:srgbClr val="FFFDC9"/>
+              </a:gs>
+            </a:gsLst>
+            <a:lin ang="0" scaled="1"/>
+            <a:tileRect/>
+          </a:gradFill>
+          <a:ln w="3175" cap="flat" cmpd="sng" algn="ctr">
+            <a:solidFill>
+              <a:schemeClr val="tx1"/>
+            </a:solidFill>
+            <a:prstDash val="solid"/>
+            <a:round/>
+            <a:headEnd type="none" w="med" len="med"/>
+            <a:tailEnd type="none" w="med" len="med"/>
+          </a:ln>
+          <a:effectLst/>
+        </p:spPr>
+        <p:txBody>
+          <a:bodyPr vert="horz" wrap="square" lIns="91440" tIns="45720" rIns="91440" bIns="45720" numCol="1" rtlCol="0" anchor="t" anchorCtr="0" compatLnSpc="1">
+            <a:prstTxWarp prst="textNoShape">
+              <a:avLst/>
+            </a:prstTxWarp>
+          </a:bodyPr>
+          <a:lstStyle/>
+          <a:p>
+            <a:pPr marL="0" marR="0" indent="0" algn="l" defTabSz="914400" rtl="0" eaLnBrk="0" fontAlgn="base" latinLnBrk="0" hangingPunct="0">
+              <a:lnSpc>
+                <a:spcPct val="100000"/>
+              </a:lnSpc>
+              <a:spcBef>
+                <a:spcPct val="0"/>
+              </a:spcBef>
+              <a:spcAft>
+                <a:spcPct val="0"/>
+              </a:spcAft>
+              <a:buClrTx/>
+              <a:buSzTx/>
+              <a:buFontTx/>
+              <a:buNone/>
+              <a:tabLst/>
+            </a:pPr>
+            <a:endParaRPr kumimoji="0" lang="en-US" sz="2400" b="0" i="0" u="none" strike="noStrike" cap="none" normalizeH="0" baseline="0">
+              <a:ln>
+                <a:noFill/>
+              </a:ln>
+              <a:solidFill>
+                <a:schemeClr val="tx1"/>
+              </a:solidFill>
+              <a:effectLst/>
+              <a:latin typeface="Times New Roman" charset="0"/>
+            </a:endParaRPr>
+          </a:p>
+        </p:txBody>
+      </p:sp>
+      <p:sp>
+        <p:nvSpPr>
+          <p:cNvPr id="11" name="Rectangle 10"/>
+          <p:cNvSpPr/>
+          <p:nvPr/>
+        </p:nvSpPr>
+        <p:spPr bwMode="auto">
+          <a:xfrm>
+            <a:off x="838200" y="4724400"/>
+            <a:ext cx="3657600" cy="685800"/>
+          </a:xfrm>
+          <a:prstGeom prst="rect">
+            <a:avLst/>
+          </a:prstGeom>
+          <a:gradFill flip="none" rotWithShape="1">
+            <a:gsLst>
+              <a:gs pos="0">
+                <a:srgbClr val="0000FF"/>
+              </a:gs>
+              <a:gs pos="100000">
+                <a:srgbClr val="FF0000"/>
+              </a:gs>
+              <a:gs pos="50000">
+                <a:srgbClr val="FFFFFF"/>
+              </a:gs>
+            </a:gsLst>
+            <a:lin ang="0" scaled="1"/>
+            <a:tileRect/>
+          </a:gradFill>
+          <a:ln w="3175" cap="flat" cmpd="sng" algn="ctr">
+            <a:solidFill>
+              <a:schemeClr val="tx1"/>
+            </a:solidFill>
+            <a:prstDash val="solid"/>
+            <a:round/>
+            <a:headEnd type="none" w="med" len="med"/>
+            <a:tailEnd type="none" w="med" len="med"/>
+          </a:ln>
+          <a:effectLst/>
+        </p:spPr>
+        <p:txBody>
+          <a:bodyPr vert="horz" wrap="square" lIns="91440" tIns="45720" rIns="91440" bIns="45720" numCol="1" rtlCol="0" anchor="t" anchorCtr="0" compatLnSpc="1">
+            <a:prstTxWarp prst="textNoShape">
+              <a:avLst/>
+            </a:prstTxWarp>
+          </a:bodyPr>
+          <a:lstStyle/>
+          <a:p>
+            <a:pPr marL="0" marR="0" indent="0" algn="l" defTabSz="914400" rtl="0" eaLnBrk="0" fontAlgn="base" latinLnBrk="0" hangingPunct="0">
+              <a:lnSpc>
+                <a:spcPct val="100000"/>
+              </a:lnSpc>
+              <a:spcBef>
+                <a:spcPct val="0"/>
+              </a:spcBef>
+              <a:spcAft>
+                <a:spcPct val="0"/>
+              </a:spcAft>
+              <a:buClrTx/>
+              <a:buSzTx/>
+              <a:buFontTx/>
+              <a:buNone/>
+              <a:tabLst/>
+            </a:pPr>
+            <a:endParaRPr kumimoji="0" lang="en-US" sz="2400" b="0" i="0" u="none" strike="noStrike" cap="none" normalizeH="0" baseline="0">
+              <a:ln>
+                <a:noFill/>
+              </a:ln>
+              <a:solidFill>
+                <a:schemeClr val="tx1"/>
+              </a:solidFill>
+              <a:effectLst/>
+              <a:latin typeface="Times New Roman" charset="0"/>
+            </a:endParaRPr>
+          </a:p>
+        </p:txBody>
+      </p:sp>
+      <p:sp>
+        <p:nvSpPr>
+          <p:cNvPr id="12" name="TextBox 11"/>
+          <p:cNvSpPr txBox="1"/>
+          <p:nvPr/>
+        </p:nvSpPr>
+        <p:spPr>
+          <a:xfrm>
+            <a:off x="304800" y="6019800"/>
+            <a:ext cx="7567120" cy="400110"/>
+          </a:xfrm>
+          <a:prstGeom prst="rect">
+            <a:avLst/>
+          </a:prstGeom>
+          <a:noFill/>
+        </p:spPr>
+        <p:txBody>
+          <a:bodyPr wrap="none" rtlCol="0">
+            <a:spAutoFit/>
+          </a:bodyPr>
+          <a:lstStyle/>
+          <a:p>
+            <a:r>
+              <a:rPr lang="en-US" sz="2000" dirty="0" smtClean="0"/>
+              <a:t>From Ware [2004], </a:t>
+            </a:r>
+            <a:r>
+              <a:rPr lang="en-US" sz="2000" dirty="0" err="1" smtClean="0"/>
+              <a:t>Rheingans</a:t>
+            </a:r>
+            <a:r>
+              <a:rPr lang="en-US" sz="2000" dirty="0" smtClean="0"/>
+              <a:t> [1999], Brewer [2005], and Stone [2003]</a:t>
+            </a:r>
+            <a:endParaRPr lang="en-US" sz="2000" dirty="0"/>
+          </a:p>
+        </p:txBody>
+      </p:sp>
+    </p:spTree>
+  </p:cSld>
+  <p:clrMapOvr>
+    <a:masterClrMapping/>
+  </p:clrMapOvr>
+  <p:transition>
+    <p:fade/>
+  </p:transition>
+</p:sld>
+</file>
+
+<file path=ppt/slides/slide16.xml><?xml version="1.0" encoding="utf-8"?>
+<p:sld xmlns:a="http://schemas.openxmlformats.org/drawingml/2006/main" xmlns:r="http://schemas.openxmlformats.org/officeDocument/2006/relationships" xmlns:mc="http://schemas.openxmlformats.org/markup-compatibility/2006" xmlns:mv="urn:schemas-microsoft-com:mac:vml" xmlns:p="http://schemas.openxmlformats.org/presentationml/2006/main" mc:Ignorable="mv" mc:PreserveAttributes="mv:*">
+  <p:cSld>
+    <p:spTree>
+      <p:nvGrpSpPr>
+        <p:cNvPr id="1" name=""/>
+        <p:cNvGrpSpPr/>
+        <p:nvPr/>
+      </p:nvGrpSpPr>
+      <p:grpSpPr>
+        <a:xfrm>
+          <a:off x="0" y="0"/>
+          <a:ext cx="0" cy="0"/>
+          <a:chOff x="0" y="0"/>
+          <a:chExt cx="0" cy="0"/>
+        </a:xfrm>
+      </p:grpSpPr>
+      <p:sp>
+        <p:nvSpPr>
+          <p:cNvPr id="2" name="Title 1"/>
+          <p:cNvSpPr>
+            <a:spLocks noGrp="1"/>
+          </p:cNvSpPr>
+          <p:nvPr>
+            <p:ph type="title"/>
+          </p:nvPr>
+        </p:nvSpPr>
+        <p:spPr/>
+        <p:txBody>
+          <a:bodyPr/>
+          <a:lstStyle/>
+          <a:p>
+            <a:r>
               <a:rPr lang="en-US" smtClean="0"/>
               <a:t>Color Map Requirements</a:t>
             </a:r>
@@ -5445,7 +6661,87 @@
           <a:bodyPr/>
           <a:lstStyle/>
           <a:p>
-            <a:endParaRPr lang="en-US"/>
+            <a:pPr>
+              <a:buNone/>
+            </a:pPr>
+            <a:r>
+              <a:rPr lang="en-US" i="1" dirty="0" smtClean="0"/>
+              <a:t>IEEE Computer Graphics &amp; Applications</a:t>
+            </a:r>
+            <a:r>
+              <a:rPr lang="en-US" dirty="0" smtClean="0"/>
+              <a:t>, (27) 3</a:t>
+            </a:r>
+          </a:p>
+          <a:p>
+            <a:pPr lvl="1">
+              <a:buNone/>
+            </a:pPr>
+            <a:r>
+              <a:rPr lang="en-US" dirty="0" smtClean="0"/>
+              <a:t>Borland and Taylor</a:t>
+            </a:r>
+          </a:p>
+          <a:p>
+            <a:pPr lvl="1">
+              <a:buNone/>
+            </a:pPr>
+            <a:r>
+              <a:rPr lang="en-US" dirty="0" smtClean="0"/>
+              <a:t>Rainbow Color Map (Still) Considered Harmful</a:t>
+            </a:r>
+          </a:p>
+          <a:p>
+            <a:pPr>
+              <a:buNone/>
+            </a:pPr>
+            <a:endParaRPr lang="en-US" dirty="0" smtClean="0"/>
+          </a:p>
+          <a:p>
+            <a:pPr marL="173038" indent="-1588">
+              <a:buNone/>
+            </a:pPr>
+            <a:r>
+              <a:rPr lang="en-US" dirty="0" smtClean="0"/>
+              <a:t>“The fact that [the rainbow color map] is selected as the default color map in many visualization toolkits encourages its popularity (both within the visualization community and to casual users)… Inspection or documentation indicated that </a:t>
+            </a:r>
+            <a:r>
+              <a:rPr lang="en-US" b="1" dirty="0" smtClean="0"/>
+              <a:t>ParaView</a:t>
+            </a:r>
+            <a:r>
+              <a:rPr lang="en-US" dirty="0" smtClean="0"/>
+              <a:t>,</a:t>
+            </a:r>
+            <a:r>
+              <a:rPr lang="en-US" b="1" dirty="0" smtClean="0"/>
+              <a:t> </a:t>
+            </a:r>
+            <a:r>
+              <a:rPr lang="en-US" dirty="0" err="1" smtClean="0"/>
+              <a:t>Matlab</a:t>
+            </a:r>
+            <a:r>
+              <a:rPr lang="en-US" dirty="0" smtClean="0"/>
+              <a:t>, </a:t>
+            </a:r>
+            <a:r>
+              <a:rPr lang="en-US" dirty="0" err="1" smtClean="0"/>
+              <a:t>VisAD</a:t>
+            </a:r>
+            <a:r>
+              <a:rPr lang="en-US" dirty="0" smtClean="0"/>
+              <a:t>, </a:t>
+            </a:r>
+            <a:r>
+              <a:rPr lang="en-US" dirty="0" err="1" smtClean="0"/>
+              <a:t>Ensight</a:t>
+            </a:r>
+            <a:r>
+              <a:rPr lang="en-US" dirty="0" smtClean="0"/>
+              <a:t>, Iris Explorer and AVS Express all use the rainbow color map by default.”</a:t>
+            </a:r>
+            <a:endParaRPr lang="en-US" dirty="0" smtClean="0"/>
           </a:p>
         </p:txBody>
       </p:sp>
@@ -8017,6 +9313,135 @@
             <a:r>
               <a:rPr lang="en-US" dirty="0" smtClean="0"/>
               <a:t>Rainbow Color Map Problems</a:t>
+            </a:r>
+            <a:endParaRPr lang="en-US" dirty="0"/>
+          </a:p>
+        </p:txBody>
+      </p:sp>
+      <p:pic>
+        <p:nvPicPr>
+          <p:cNvPr id="3" name="Picture 2" descr="PressureRainbow.png"/>
+          <p:cNvPicPr>
+            <a:picLocks noChangeAspect="1"/>
+          </p:cNvPicPr>
+          <p:nvPr/>
+        </p:nvPicPr>
+        <p:blipFill>
+          <a:blip r:embed="rId3"/>
+          <a:stretch>
+            <a:fillRect/>
+          </a:stretch>
+        </p:blipFill>
+        <p:spPr>
+          <a:xfrm>
+            <a:off x="1828800" y="1524000"/>
+            <a:ext cx="2286000" cy="4572000"/>
+          </a:xfrm>
+          <a:prstGeom prst="rect">
+            <a:avLst/>
+          </a:prstGeom>
+        </p:spPr>
+      </p:pic>
+      <p:pic>
+        <p:nvPicPr>
+          <p:cNvPr id="4" name="Picture 3" descr="PressureRainbowDeuteranope.png"/>
+          <p:cNvPicPr>
+            <a:picLocks noChangeAspect="1"/>
+          </p:cNvPicPr>
+          <p:nvPr/>
+        </p:nvPicPr>
+        <p:blipFill>
+          <a:blip r:embed="rId4"/>
+          <a:stretch>
+            <a:fillRect/>
+          </a:stretch>
+        </p:blipFill>
+        <p:spPr>
+          <a:xfrm>
+            <a:off x="5029200" y="1524000"/>
+            <a:ext cx="2286000" cy="4572000"/>
+          </a:xfrm>
+          <a:prstGeom prst="rect">
+            <a:avLst/>
+          </a:prstGeom>
+        </p:spPr>
+      </p:pic>
+      <p:sp>
+        <p:nvSpPr>
+          <p:cNvPr id="5" name="TextBox 4"/>
+          <p:cNvSpPr txBox="1"/>
+          <p:nvPr/>
+        </p:nvSpPr>
+        <p:spPr>
+          <a:xfrm>
+            <a:off x="2362200" y="5867400"/>
+            <a:ext cx="1210337" cy="461665"/>
+          </a:xfrm>
+          <a:prstGeom prst="rect">
+            <a:avLst/>
+          </a:prstGeom>
+          <a:noFill/>
+        </p:spPr>
+        <p:txBody>
+          <a:bodyPr wrap="none" rtlCol="0">
+            <a:spAutoFit/>
+          </a:bodyPr>
+          <a:lstStyle/>
+          <a:p>
+            <a:pPr algn="ctr"/>
+            <a:r>
+              <a:rPr lang="en-US" dirty="0" smtClean="0"/>
+              <a:t>Original</a:t>
+            </a:r>
+            <a:endParaRPr lang="en-US" dirty="0"/>
+          </a:p>
+        </p:txBody>
+      </p:sp>
+      <p:sp>
+        <p:nvSpPr>
+          <p:cNvPr id="6" name="TextBox 5"/>
+          <p:cNvSpPr txBox="1"/>
+          <p:nvPr/>
+        </p:nvSpPr>
+        <p:spPr>
+          <a:xfrm>
+            <a:off x="4572000" y="5791200"/>
+            <a:ext cx="3220503" cy="830997"/>
+          </a:xfrm>
+          <a:prstGeom prst="rect">
+            <a:avLst/>
+          </a:prstGeom>
+          <a:noFill/>
+        </p:spPr>
+        <p:txBody>
+          <a:bodyPr wrap="none" rtlCol="0">
+            <a:spAutoFit/>
+          </a:bodyPr>
+          <a:lstStyle/>
+          <a:p>
+            <a:pPr algn="ctr"/>
+            <a:r>
+              <a:rPr lang="en-US" dirty="0" err="1" smtClean="0"/>
+              <a:t>Deuteranope</a:t>
+            </a:r>
+            <a:r>
+              <a:rPr lang="en-US" dirty="0" smtClean="0"/>
+              <a:t> Vision</a:t>
+            </a:r>
+          </a:p>
+          <a:p>
+            <a:pPr algn="ctr"/>
+            <a:r>
+              <a:rPr lang="en-US" dirty="0" smtClean="0"/>
+              <a:t>(Simulated by </a:t>
+            </a:r>
+            <a:r>
+              <a:rPr lang="en-US" dirty="0" err="1" smtClean="0"/>
+              <a:t>Vischeck</a:t>
+            </a:r>
+            <a:r>
+              <a:rPr lang="en-US" dirty="0" smtClean="0"/>
+              <a:t>)</a:t>
             </a:r>
             <a:endParaRPr lang="en-US" dirty="0"/>
           </a:p>

</xml_diff>